<commit_message>
DRAFT - CSVD tuto
</commit_message>
<xml_diff>
--- a/material/01_csvd.pptx
+++ b/material/01_csvd.pptx
@@ -104,6 +104,11 @@
       </a:defRPr>
     </a:lvl9pPr>
   </p:defaultTextStyle>
+  <p:extLst>
+    <p:ext uri="{EFAFB233-063F-42B5-8137-9DF3F51BA10A}">
+      <p15:sldGuideLst xmlns:p15="http://schemas.microsoft.com/office/powerpoint/2012/main"/>
+    </p:ext>
+  </p:extLst>
 </p:presentation>
 </file>
 
@@ -254,7 +259,7 @@
           <a:p>
             <a:fld id="{2505A8C2-BC86-5A44-8491-E4BC07952210}" type="datetimeFigureOut">
               <a:rPr lang="fr-FR" smtClean="0"/>
-              <a:t>17/05/2024</a:t>
+              <a:t>29/05/2024</a:t>
             </a:fld>
             <a:endParaRPr lang="fr-FR"/>
           </a:p>
@@ -452,7 +457,7 @@
           <a:p>
             <a:fld id="{2505A8C2-BC86-5A44-8491-E4BC07952210}" type="datetimeFigureOut">
               <a:rPr lang="fr-FR" smtClean="0"/>
-              <a:t>17/05/2024</a:t>
+              <a:t>29/05/2024</a:t>
             </a:fld>
             <a:endParaRPr lang="fr-FR"/>
           </a:p>
@@ -660,7 +665,7 @@
           <a:p>
             <a:fld id="{2505A8C2-BC86-5A44-8491-E4BC07952210}" type="datetimeFigureOut">
               <a:rPr lang="fr-FR" smtClean="0"/>
-              <a:t>17/05/2024</a:t>
+              <a:t>29/05/2024</a:t>
             </a:fld>
             <a:endParaRPr lang="fr-FR"/>
           </a:p>
@@ -858,7 +863,7 @@
           <a:p>
             <a:fld id="{2505A8C2-BC86-5A44-8491-E4BC07952210}" type="datetimeFigureOut">
               <a:rPr lang="fr-FR" smtClean="0"/>
-              <a:t>17/05/2024</a:t>
+              <a:t>29/05/2024</a:t>
             </a:fld>
             <a:endParaRPr lang="fr-FR"/>
           </a:p>
@@ -1133,7 +1138,7 @@
           <a:p>
             <a:fld id="{2505A8C2-BC86-5A44-8491-E4BC07952210}" type="datetimeFigureOut">
               <a:rPr lang="fr-FR" smtClean="0"/>
-              <a:t>17/05/2024</a:t>
+              <a:t>29/05/2024</a:t>
             </a:fld>
             <a:endParaRPr lang="fr-FR"/>
           </a:p>
@@ -1398,7 +1403,7 @@
           <a:p>
             <a:fld id="{2505A8C2-BC86-5A44-8491-E4BC07952210}" type="datetimeFigureOut">
               <a:rPr lang="fr-FR" smtClean="0"/>
-              <a:t>17/05/2024</a:t>
+              <a:t>29/05/2024</a:t>
             </a:fld>
             <a:endParaRPr lang="fr-FR"/>
           </a:p>
@@ -1810,7 +1815,7 @@
           <a:p>
             <a:fld id="{2505A8C2-BC86-5A44-8491-E4BC07952210}" type="datetimeFigureOut">
               <a:rPr lang="fr-FR" smtClean="0"/>
-              <a:t>17/05/2024</a:t>
+              <a:t>29/05/2024</a:t>
             </a:fld>
             <a:endParaRPr lang="fr-FR"/>
           </a:p>
@@ -1951,7 +1956,7 @@
           <a:p>
             <a:fld id="{2505A8C2-BC86-5A44-8491-E4BC07952210}" type="datetimeFigureOut">
               <a:rPr lang="fr-FR" smtClean="0"/>
-              <a:t>17/05/2024</a:t>
+              <a:t>29/05/2024</a:t>
             </a:fld>
             <a:endParaRPr lang="fr-FR"/>
           </a:p>
@@ -2064,7 +2069,7 @@
           <a:p>
             <a:fld id="{2505A8C2-BC86-5A44-8491-E4BC07952210}" type="datetimeFigureOut">
               <a:rPr lang="fr-FR" smtClean="0"/>
-              <a:t>17/05/2024</a:t>
+              <a:t>29/05/2024</a:t>
             </a:fld>
             <a:endParaRPr lang="fr-FR"/>
           </a:p>
@@ -2375,7 +2380,7 @@
           <a:p>
             <a:fld id="{2505A8C2-BC86-5A44-8491-E4BC07952210}" type="datetimeFigureOut">
               <a:rPr lang="fr-FR" smtClean="0"/>
-              <a:t>17/05/2024</a:t>
+              <a:t>29/05/2024</a:t>
             </a:fld>
             <a:endParaRPr lang="fr-FR"/>
           </a:p>
@@ -2663,7 +2668,7 @@
           <a:p>
             <a:fld id="{2505A8C2-BC86-5A44-8491-E4BC07952210}" type="datetimeFigureOut">
               <a:rPr lang="fr-FR" smtClean="0"/>
-              <a:t>17/05/2024</a:t>
+              <a:t>29/05/2024</a:t>
             </a:fld>
             <a:endParaRPr lang="fr-FR"/>
           </a:p>
@@ -2904,7 +2909,7 @@
           <a:p>
             <a:fld id="{2505A8C2-BC86-5A44-8491-E4BC07952210}" type="datetimeFigureOut">
               <a:rPr lang="fr-FR" smtClean="0"/>
-              <a:t>17/05/2024</a:t>
+              <a:t>29/05/2024</a:t>
             </a:fld>
             <a:endParaRPr lang="fr-FR"/>
           </a:p>
@@ -3342,7 +3347,27 @@
           <a:bodyPr/>
           <a:lstStyle/>
           <a:p>
-            <a:endParaRPr lang="fr-FR"/>
+            <a:r>
+              <a:rPr lang="fr-FR" dirty="0" err="1"/>
+              <a:t>Constrained</a:t>
+            </a:r>
+            <a:r>
+              <a:rPr lang="fr-FR" dirty="0"/>
+              <a:t> </a:t>
+            </a:r>
+            <a:r>
+              <a:rPr lang="fr-FR" dirty="0" err="1"/>
+              <a:t>Singular</a:t>
+            </a:r>
+            <a:r>
+              <a:rPr lang="fr-FR" dirty="0"/>
+              <a:t> Value </a:t>
+            </a:r>
+            <a:r>
+              <a:rPr lang="fr-FR" dirty="0" err="1"/>
+              <a:t>Decomposition</a:t>
+            </a:r>
+            <a:endParaRPr lang="fr-FR" dirty="0"/>
           </a:p>
         </p:txBody>
       </p:sp>
@@ -3364,10 +3389,33 @@
         </p:nvSpPr>
         <p:spPr/>
         <p:txBody>
-          <a:bodyPr/>
-          <a:lstStyle/>
-          <a:p>
-            <a:endParaRPr lang="fr-FR"/>
+          <a:bodyPr>
+            <a:normAutofit lnSpcReduction="10000"/>
+          </a:bodyPr>
+          <a:lstStyle/>
+          <a:p>
+            <a:r>
+              <a:rPr lang="fr-FR" dirty="0"/>
+              <a:t>Vincent Guillemot</a:t>
+            </a:r>
+          </a:p>
+          <a:p>
+            <a:r>
+              <a:rPr lang="fr-FR" dirty="0"/>
+              <a:t>Ju-Chi Yu</a:t>
+            </a:r>
+          </a:p>
+          <a:p>
+            <a:r>
+              <a:rPr lang="fr-FR" dirty="0"/>
+              <a:t>Vincent Le Goff</a:t>
+            </a:r>
+          </a:p>
+          <a:p>
+            <a:r>
+              <a:rPr lang="fr-FR" dirty="0"/>
+              <a:t>Hervé Abdi</a:t>
+            </a:r>
           </a:p>
         </p:txBody>
       </p:sp>

</xml_diff>